<commit_message>
altered software architecture slides
</commit_message>
<xml_diff>
--- a/Presentation/Group-04-Presentation.pptx
+++ b/Presentation/Group-04-Presentation.pptx
@@ -735,7 +735,7 @@
           <a:noFill/>
           <a:extLst>
             <a:ext uri="{909E8E84-426E-40dd-AFC4-6F175D3DCCD1}">
-              <a14:hiddenFill xmlns="" xmlns:a14="http://schemas.microsoft.com/office/drawing/2010/main">
+              <a14:hiddenFill xmlns:a14="http://schemas.microsoft.com/office/drawing/2010/main" xmlns="">
                 <a:solidFill>
                   <a:srgbClr val="FFFFFF"/>
                 </a:solidFill>
@@ -794,7 +794,7 @@
             </a:ln>
             <a:extLst>
               <a:ext uri="{91240B29-F687-4f45-9708-019B960494DF}">
-                <a14:hiddenLine xmlns="" xmlns:a14="http://schemas.microsoft.com/office/drawing/2010/main" w="9525">
+                <a14:hiddenLine xmlns:a14="http://schemas.microsoft.com/office/drawing/2010/main" xmlns="" w="9525">
                   <a:solidFill>
                     <a:srgbClr val="000000"/>
                   </a:solidFill>
@@ -884,7 +884,7 @@
             </a:ln>
             <a:extLst>
               <a:ext uri="{91240B29-F687-4f45-9708-019B960494DF}">
-                <a14:hiddenLine xmlns="" xmlns:a14="http://schemas.microsoft.com/office/drawing/2010/main" w="9525">
+                <a14:hiddenLine xmlns:a14="http://schemas.microsoft.com/office/drawing/2010/main" xmlns="" w="9525">
                   <a:solidFill>
                     <a:srgbClr val="000000"/>
                   </a:solidFill>
@@ -974,7 +974,7 @@
             </a:ln>
             <a:extLst>
               <a:ext uri="{91240B29-F687-4f45-9708-019B960494DF}">
-                <a14:hiddenLine xmlns="" xmlns:a14="http://schemas.microsoft.com/office/drawing/2010/main" w="9525">
+                <a14:hiddenLine xmlns:a14="http://schemas.microsoft.com/office/drawing/2010/main" xmlns="" w="9525">
                   <a:solidFill>
                     <a:srgbClr val="000000"/>
                   </a:solidFill>
@@ -1008,7 +1008,7 @@
             </a:ln>
             <a:extLst>
               <a:ext uri="{91240B29-F687-4f45-9708-019B960494DF}">
-                <a14:hiddenLine xmlns="" xmlns:a14="http://schemas.microsoft.com/office/drawing/2010/main" w="9525">
+                <a14:hiddenLine xmlns:a14="http://schemas.microsoft.com/office/drawing/2010/main" xmlns="" w="9525">
                   <a:solidFill>
                     <a:srgbClr val="000000"/>
                   </a:solidFill>
@@ -1098,7 +1098,7 @@
             </a:ln>
             <a:extLst>
               <a:ext uri="{91240B29-F687-4f45-9708-019B960494DF}">
-                <a14:hiddenLine xmlns="" xmlns:a14="http://schemas.microsoft.com/office/drawing/2010/main" w="9525">
+                <a14:hiddenLine xmlns:a14="http://schemas.microsoft.com/office/drawing/2010/main" xmlns="" w="9525">
                   <a:solidFill>
                     <a:srgbClr val="000000"/>
                   </a:solidFill>
@@ -1160,7 +1160,7 @@
             </a:ln>
             <a:extLst>
               <a:ext uri="{91240B29-F687-4f45-9708-019B960494DF}">
-                <a14:hiddenLine xmlns="" xmlns:a14="http://schemas.microsoft.com/office/drawing/2010/main" w="9525">
+                <a14:hiddenLine xmlns:a14="http://schemas.microsoft.com/office/drawing/2010/main" xmlns="" w="9525">
                   <a:solidFill>
                     <a:srgbClr val="000000"/>
                   </a:solidFill>
@@ -1222,7 +1222,7 @@
             </a:ln>
             <a:extLst>
               <a:ext uri="{91240B29-F687-4f45-9708-019B960494DF}">
-                <a14:hiddenLine xmlns="" xmlns:a14="http://schemas.microsoft.com/office/drawing/2010/main" w="9525">
+                <a14:hiddenLine xmlns:a14="http://schemas.microsoft.com/office/drawing/2010/main" xmlns="" w="9525">
                   <a:solidFill>
                     <a:srgbClr val="000000"/>
                   </a:solidFill>
@@ -1312,7 +1312,7 @@
             </a:ln>
             <a:extLst>
               <a:ext uri="{91240B29-F687-4f45-9708-019B960494DF}">
-                <a14:hiddenLine xmlns="" xmlns:a14="http://schemas.microsoft.com/office/drawing/2010/main" w="9525">
+                <a14:hiddenLine xmlns:a14="http://schemas.microsoft.com/office/drawing/2010/main" xmlns="" w="9525">
                   <a:solidFill>
                     <a:srgbClr val="000000"/>
                   </a:solidFill>
@@ -1374,7 +1374,7 @@
             </a:ln>
             <a:extLst>
               <a:ext uri="{91240B29-F687-4f45-9708-019B960494DF}">
-                <a14:hiddenLine xmlns="" xmlns:a14="http://schemas.microsoft.com/office/drawing/2010/main" w="9525">
+                <a14:hiddenLine xmlns:a14="http://schemas.microsoft.com/office/drawing/2010/main" xmlns="" w="9525">
                   <a:solidFill>
                     <a:srgbClr val="000000"/>
                   </a:solidFill>
@@ -1436,7 +1436,7 @@
             </a:ln>
             <a:extLst>
               <a:ext uri="{91240B29-F687-4f45-9708-019B960494DF}">
-                <a14:hiddenLine xmlns="" xmlns:a14="http://schemas.microsoft.com/office/drawing/2010/main" w="9525">
+                <a14:hiddenLine xmlns:a14="http://schemas.microsoft.com/office/drawing/2010/main" xmlns="" w="9525">
                   <a:solidFill>
                     <a:srgbClr val="000000"/>
                   </a:solidFill>
@@ -1526,7 +1526,7 @@
             </a:ln>
             <a:extLst>
               <a:ext uri="{91240B29-F687-4f45-9708-019B960494DF}">
-                <a14:hiddenLine xmlns="" xmlns:a14="http://schemas.microsoft.com/office/drawing/2010/main" w="9525">
+                <a14:hiddenLine xmlns:a14="http://schemas.microsoft.com/office/drawing/2010/main" xmlns="" w="9525">
                   <a:solidFill>
                     <a:srgbClr val="000000"/>
                   </a:solidFill>
@@ -1616,7 +1616,7 @@
             </a:ln>
             <a:extLst>
               <a:ext uri="{91240B29-F687-4f45-9708-019B960494DF}">
-                <a14:hiddenLine xmlns="" xmlns:a14="http://schemas.microsoft.com/office/drawing/2010/main" w="9525">
+                <a14:hiddenLine xmlns:a14="http://schemas.microsoft.com/office/drawing/2010/main" xmlns="" w="9525">
                   <a:solidFill>
                     <a:srgbClr val="000000"/>
                   </a:solidFill>
@@ -1678,7 +1678,7 @@
             </a:ln>
             <a:extLst>
               <a:ext uri="{91240B29-F687-4f45-9708-019B960494DF}">
-                <a14:hiddenLine xmlns="" xmlns:a14="http://schemas.microsoft.com/office/drawing/2010/main" w="9525">
+                <a14:hiddenLine xmlns:a14="http://schemas.microsoft.com/office/drawing/2010/main" xmlns="" w="9525">
                   <a:solidFill>
                     <a:srgbClr val="000000"/>
                   </a:solidFill>
@@ -1788,7 +1788,7 @@
             </a:ln>
             <a:extLst>
               <a:ext uri="{91240B29-F687-4f45-9708-019B960494DF}">
-                <a14:hiddenLine xmlns="" xmlns:a14="http://schemas.microsoft.com/office/drawing/2010/main" w="9525">
+                <a14:hiddenLine xmlns:a14="http://schemas.microsoft.com/office/drawing/2010/main" xmlns="" w="9525">
                   <a:solidFill>
                     <a:srgbClr val="000000"/>
                   </a:solidFill>
@@ -1850,7 +1850,7 @@
             </a:ln>
             <a:extLst>
               <a:ext uri="{91240B29-F687-4f45-9708-019B960494DF}">
-                <a14:hiddenLine xmlns="" xmlns:a14="http://schemas.microsoft.com/office/drawing/2010/main" w="9525">
+                <a14:hiddenLine xmlns:a14="http://schemas.microsoft.com/office/drawing/2010/main" xmlns="" w="9525">
                   <a:solidFill>
                     <a:srgbClr val="000000"/>
                   </a:solidFill>
@@ -1940,7 +1940,7 @@
             </a:ln>
             <a:extLst>
               <a:ext uri="{91240B29-F687-4f45-9708-019B960494DF}">
-                <a14:hiddenLine xmlns="" xmlns:a14="http://schemas.microsoft.com/office/drawing/2010/main" w="9525">
+                <a14:hiddenLine xmlns:a14="http://schemas.microsoft.com/office/drawing/2010/main" xmlns="" w="9525">
                   <a:solidFill>
                     <a:srgbClr val="000000"/>
                   </a:solidFill>
@@ -2030,7 +2030,7 @@
             </a:ln>
             <a:extLst>
               <a:ext uri="{91240B29-F687-4f45-9708-019B960494DF}">
-                <a14:hiddenLine xmlns="" xmlns:a14="http://schemas.microsoft.com/office/drawing/2010/main" w="9525">
+                <a14:hiddenLine xmlns:a14="http://schemas.microsoft.com/office/drawing/2010/main" xmlns="" w="9525">
                   <a:solidFill>
                     <a:srgbClr val="000000"/>
                   </a:solidFill>
@@ -2092,7 +2092,7 @@
             </a:ln>
             <a:extLst>
               <a:ext uri="{91240B29-F687-4f45-9708-019B960494DF}">
-                <a14:hiddenLine xmlns="" xmlns:a14="http://schemas.microsoft.com/office/drawing/2010/main" w="9525">
+                <a14:hiddenLine xmlns:a14="http://schemas.microsoft.com/office/drawing/2010/main" xmlns="" w="9525">
                   <a:solidFill>
                     <a:srgbClr val="000000"/>
                   </a:solidFill>
@@ -2182,7 +2182,7 @@
             </a:ln>
             <a:extLst>
               <a:ext uri="{91240B29-F687-4f45-9708-019B960494DF}">
-                <a14:hiddenLine xmlns="" xmlns:a14="http://schemas.microsoft.com/office/drawing/2010/main" w="9525">
+                <a14:hiddenLine xmlns:a14="http://schemas.microsoft.com/office/drawing/2010/main" xmlns="" w="9525">
                   <a:solidFill>
                     <a:srgbClr val="000000"/>
                   </a:solidFill>
@@ -2272,7 +2272,7 @@
             </a:ln>
             <a:extLst>
               <a:ext uri="{91240B29-F687-4f45-9708-019B960494DF}">
-                <a14:hiddenLine xmlns="" xmlns:a14="http://schemas.microsoft.com/office/drawing/2010/main" w="9525">
+                <a14:hiddenLine xmlns:a14="http://schemas.microsoft.com/office/drawing/2010/main" xmlns="" w="9525">
                   <a:solidFill>
                     <a:srgbClr val="000000"/>
                   </a:solidFill>
@@ -2328,7 +2328,7 @@
             </a:ln>
             <a:extLst>
               <a:ext uri="{91240B29-F687-4f45-9708-019B960494DF}">
-                <a14:hiddenLine xmlns="" xmlns:a14="http://schemas.microsoft.com/office/drawing/2010/main" w="9525">
+                <a14:hiddenLine xmlns:a14="http://schemas.microsoft.com/office/drawing/2010/main" xmlns="" w="9525">
                   <a:solidFill>
                     <a:srgbClr val="000000"/>
                   </a:solidFill>
@@ -2418,7 +2418,7 @@
             </a:ln>
             <a:extLst>
               <a:ext uri="{91240B29-F687-4f45-9708-019B960494DF}">
-                <a14:hiddenLine xmlns="" xmlns:a14="http://schemas.microsoft.com/office/drawing/2010/main" w="9525">
+                <a14:hiddenLine xmlns:a14="http://schemas.microsoft.com/office/drawing/2010/main" xmlns="" w="9525">
                   <a:solidFill>
                     <a:srgbClr val="000000"/>
                   </a:solidFill>
@@ -2474,7 +2474,7 @@
             </a:ln>
             <a:extLst>
               <a:ext uri="{91240B29-F687-4f45-9708-019B960494DF}">
-                <a14:hiddenLine xmlns="" xmlns:a14="http://schemas.microsoft.com/office/drawing/2010/main" w="9525">
+                <a14:hiddenLine xmlns:a14="http://schemas.microsoft.com/office/drawing/2010/main" xmlns="" w="9525">
                   <a:solidFill>
                     <a:srgbClr val="000000"/>
                   </a:solidFill>
@@ -2564,7 +2564,7 @@
             </a:ln>
             <a:extLst>
               <a:ext uri="{91240B29-F687-4f45-9708-019B960494DF}">
-                <a14:hiddenLine xmlns="" xmlns:a14="http://schemas.microsoft.com/office/drawing/2010/main" w="9525">
+                <a14:hiddenLine xmlns:a14="http://schemas.microsoft.com/office/drawing/2010/main" xmlns="" w="9525">
                   <a:solidFill>
                     <a:srgbClr val="000000"/>
                   </a:solidFill>
@@ -2632,7 +2632,7 @@
             </a:ln>
             <a:extLst>
               <a:ext uri="{91240B29-F687-4f45-9708-019B960494DF}">
-                <a14:hiddenLine xmlns="" xmlns:a14="http://schemas.microsoft.com/office/drawing/2010/main" w="9525">
+                <a14:hiddenLine xmlns:a14="http://schemas.microsoft.com/office/drawing/2010/main" xmlns="" w="9525">
                   <a:solidFill>
                     <a:srgbClr val="000000"/>
                   </a:solidFill>
@@ -2722,7 +2722,7 @@
             </a:ln>
             <a:extLst>
               <a:ext uri="{91240B29-F687-4f45-9708-019B960494DF}">
-                <a14:hiddenLine xmlns="" xmlns:a14="http://schemas.microsoft.com/office/drawing/2010/main" w="9525">
+                <a14:hiddenLine xmlns:a14="http://schemas.microsoft.com/office/drawing/2010/main" xmlns="" w="9525">
                   <a:solidFill>
                     <a:srgbClr val="000000"/>
                   </a:solidFill>
@@ -2790,7 +2790,7 @@
             </a:ln>
             <a:extLst>
               <a:ext uri="{91240B29-F687-4f45-9708-019B960494DF}">
-                <a14:hiddenLine xmlns="" xmlns:a14="http://schemas.microsoft.com/office/drawing/2010/main" w="9525">
+                <a14:hiddenLine xmlns:a14="http://schemas.microsoft.com/office/drawing/2010/main" xmlns="" w="9525">
                   <a:solidFill>
                     <a:srgbClr val="000000"/>
                   </a:solidFill>
@@ -2880,7 +2880,7 @@
             </a:ln>
             <a:extLst>
               <a:ext uri="{91240B29-F687-4f45-9708-019B960494DF}">
-                <a14:hiddenLine xmlns="" xmlns:a14="http://schemas.microsoft.com/office/drawing/2010/main" w="9525">
+                <a14:hiddenLine xmlns:a14="http://schemas.microsoft.com/office/drawing/2010/main" xmlns="" w="9525">
                   <a:solidFill>
                     <a:srgbClr val="000000"/>
                   </a:solidFill>
@@ -2914,7 +2914,7 @@
             </a:ln>
             <a:extLst>
               <a:ext uri="{91240B29-F687-4f45-9708-019B960494DF}">
-                <a14:hiddenLine xmlns="" xmlns:a14="http://schemas.microsoft.com/office/drawing/2010/main" w="9525">
+                <a14:hiddenLine xmlns:a14="http://schemas.microsoft.com/office/drawing/2010/main" xmlns="" w="9525">
                   <a:solidFill>
                     <a:srgbClr val="000000"/>
                   </a:solidFill>
@@ -3004,7 +3004,7 @@
             </a:ln>
             <a:extLst>
               <a:ext uri="{91240B29-F687-4f45-9708-019B960494DF}">
-                <a14:hiddenLine xmlns="" xmlns:a14="http://schemas.microsoft.com/office/drawing/2010/main" w="9525">
+                <a14:hiddenLine xmlns:a14="http://schemas.microsoft.com/office/drawing/2010/main" xmlns="" w="9525">
                   <a:solidFill>
                     <a:srgbClr val="000000"/>
                   </a:solidFill>
@@ -3066,7 +3066,7 @@
             </a:ln>
             <a:extLst>
               <a:ext uri="{91240B29-F687-4f45-9708-019B960494DF}">
-                <a14:hiddenLine xmlns="" xmlns:a14="http://schemas.microsoft.com/office/drawing/2010/main" w="9525">
+                <a14:hiddenLine xmlns:a14="http://schemas.microsoft.com/office/drawing/2010/main" xmlns="" w="9525">
                   <a:solidFill>
                     <a:srgbClr val="000000"/>
                   </a:solidFill>
@@ -3128,7 +3128,7 @@
             </a:ln>
             <a:extLst>
               <a:ext uri="{91240B29-F687-4f45-9708-019B960494DF}">
-                <a14:hiddenLine xmlns="" xmlns:a14="http://schemas.microsoft.com/office/drawing/2010/main" w="9525">
+                <a14:hiddenLine xmlns:a14="http://schemas.microsoft.com/office/drawing/2010/main" xmlns="" w="9525">
                   <a:solidFill>
                     <a:srgbClr val="000000"/>
                   </a:solidFill>
@@ -3218,7 +3218,7 @@
             </a:ln>
             <a:extLst>
               <a:ext uri="{91240B29-F687-4f45-9708-019B960494DF}">
-                <a14:hiddenLine xmlns="" xmlns:a14="http://schemas.microsoft.com/office/drawing/2010/main" w="9525">
+                <a14:hiddenLine xmlns:a14="http://schemas.microsoft.com/office/drawing/2010/main" xmlns="" w="9525">
                   <a:solidFill>
                     <a:srgbClr val="000000"/>
                   </a:solidFill>
@@ -3286,7 +3286,7 @@
             </a:ln>
             <a:extLst>
               <a:ext uri="{91240B29-F687-4f45-9708-019B960494DF}">
-                <a14:hiddenLine xmlns="" xmlns:a14="http://schemas.microsoft.com/office/drawing/2010/main" w="9525">
+                <a14:hiddenLine xmlns:a14="http://schemas.microsoft.com/office/drawing/2010/main" xmlns="" w="9525">
                   <a:solidFill>
                     <a:srgbClr val="000000"/>
                   </a:solidFill>
@@ -3348,7 +3348,7 @@
             </a:ln>
             <a:extLst>
               <a:ext uri="{91240B29-F687-4f45-9708-019B960494DF}">
-                <a14:hiddenLine xmlns="" xmlns:a14="http://schemas.microsoft.com/office/drawing/2010/main" w="9525">
+                <a14:hiddenLine xmlns:a14="http://schemas.microsoft.com/office/drawing/2010/main" xmlns="" w="9525">
                   <a:solidFill>
                     <a:srgbClr val="000000"/>
                   </a:solidFill>
@@ -3438,7 +3438,7 @@
             </a:ln>
             <a:extLst>
               <a:ext uri="{91240B29-F687-4f45-9708-019B960494DF}">
-                <a14:hiddenLine xmlns="" xmlns:a14="http://schemas.microsoft.com/office/drawing/2010/main" w="9525">
+                <a14:hiddenLine xmlns:a14="http://schemas.microsoft.com/office/drawing/2010/main" xmlns="" w="9525">
                   <a:solidFill>
                     <a:srgbClr val="000000"/>
                   </a:solidFill>
@@ -3500,7 +3500,7 @@
             </a:ln>
             <a:extLst>
               <a:ext uri="{91240B29-F687-4f45-9708-019B960494DF}">
-                <a14:hiddenLine xmlns="" xmlns:a14="http://schemas.microsoft.com/office/drawing/2010/main" w="9525">
+                <a14:hiddenLine xmlns:a14="http://schemas.microsoft.com/office/drawing/2010/main" xmlns="" w="9525">
                   <a:solidFill>
                     <a:srgbClr val="000000"/>
                   </a:solidFill>
@@ -3590,7 +3590,7 @@
             </a:ln>
             <a:extLst>
               <a:ext uri="{91240B29-F687-4f45-9708-019B960494DF}">
-                <a14:hiddenLine xmlns="" xmlns:a14="http://schemas.microsoft.com/office/drawing/2010/main" w="9525">
+                <a14:hiddenLine xmlns:a14="http://schemas.microsoft.com/office/drawing/2010/main" xmlns="" w="9525">
                   <a:solidFill>
                     <a:srgbClr val="000000"/>
                   </a:solidFill>
@@ -3652,7 +3652,7 @@
             </a:ln>
             <a:extLst>
               <a:ext uri="{91240B29-F687-4f45-9708-019B960494DF}">
-                <a14:hiddenLine xmlns="" xmlns:a14="http://schemas.microsoft.com/office/drawing/2010/main" w="9525">
+                <a14:hiddenLine xmlns:a14="http://schemas.microsoft.com/office/drawing/2010/main" xmlns="" w="9525">
                   <a:solidFill>
                     <a:srgbClr val="000000"/>
                   </a:solidFill>
@@ -3742,7 +3742,7 @@
             </a:ln>
             <a:extLst>
               <a:ext uri="{91240B29-F687-4f45-9708-019B960494DF}">
-                <a14:hiddenLine xmlns="" xmlns:a14="http://schemas.microsoft.com/office/drawing/2010/main" w="9525">
+                <a14:hiddenLine xmlns:a14="http://schemas.microsoft.com/office/drawing/2010/main" xmlns="" w="9525">
                   <a:solidFill>
                     <a:srgbClr val="000000"/>
                   </a:solidFill>
@@ -3776,7 +3776,7 @@
             </a:ln>
             <a:extLst>
               <a:ext uri="{91240B29-F687-4f45-9708-019B960494DF}">
-                <a14:hiddenLine xmlns="" xmlns:a14="http://schemas.microsoft.com/office/drawing/2010/main" w="9525">
+                <a14:hiddenLine xmlns:a14="http://schemas.microsoft.com/office/drawing/2010/main" xmlns="" w="9525">
                   <a:solidFill>
                     <a:srgbClr val="000000"/>
                   </a:solidFill>
@@ -3841,7 +3841,7 @@
             </a:ln>
             <a:extLst>
               <a:ext uri="{91240B29-F687-4f45-9708-019B960494DF}">
-                <a14:hiddenLine xmlns="" xmlns:a14="http://schemas.microsoft.com/office/drawing/2010/main" w="9525">
+                <a14:hiddenLine xmlns:a14="http://schemas.microsoft.com/office/drawing/2010/main" xmlns="" w="9525">
                   <a:solidFill>
                     <a:srgbClr val="000000"/>
                   </a:solidFill>
@@ -3931,7 +3931,7 @@
             </a:ln>
             <a:extLst>
               <a:ext uri="{91240B29-F687-4f45-9708-019B960494DF}">
-                <a14:hiddenLine xmlns="" xmlns:a14="http://schemas.microsoft.com/office/drawing/2010/main" w="9525">
+                <a14:hiddenLine xmlns:a14="http://schemas.microsoft.com/office/drawing/2010/main" xmlns="" w="9525">
                   <a:solidFill>
                     <a:srgbClr val="000000"/>
                   </a:solidFill>
@@ -3993,7 +3993,7 @@
             </a:ln>
             <a:extLst>
               <a:ext uri="{91240B29-F687-4f45-9708-019B960494DF}">
-                <a14:hiddenLine xmlns="" xmlns:a14="http://schemas.microsoft.com/office/drawing/2010/main" w="9525">
+                <a14:hiddenLine xmlns:a14="http://schemas.microsoft.com/office/drawing/2010/main" xmlns="" w="9525">
                   <a:solidFill>
                     <a:srgbClr val="000000"/>
                   </a:solidFill>
@@ -4083,7 +4083,7 @@
             </a:ln>
             <a:extLst>
               <a:ext uri="{91240B29-F687-4f45-9708-019B960494DF}">
-                <a14:hiddenLine xmlns="" xmlns:a14="http://schemas.microsoft.com/office/drawing/2010/main" w="9525">
+                <a14:hiddenLine xmlns:a14="http://schemas.microsoft.com/office/drawing/2010/main" xmlns="" w="9525">
                   <a:solidFill>
                     <a:srgbClr val="000000"/>
                   </a:solidFill>
@@ -4173,7 +4173,7 @@
             </a:ln>
             <a:extLst>
               <a:ext uri="{91240B29-F687-4f45-9708-019B960494DF}">
-                <a14:hiddenLine xmlns="" xmlns:a14="http://schemas.microsoft.com/office/drawing/2010/main" w="9525">
+                <a14:hiddenLine xmlns:a14="http://schemas.microsoft.com/office/drawing/2010/main" xmlns="" w="9525">
                   <a:solidFill>
                     <a:srgbClr val="000000"/>
                   </a:solidFill>
@@ -4238,7 +4238,7 @@
             </a:ln>
             <a:extLst>
               <a:ext uri="{91240B29-F687-4f45-9708-019B960494DF}">
-                <a14:hiddenLine xmlns="" xmlns:a14="http://schemas.microsoft.com/office/drawing/2010/main" w="9525">
+                <a14:hiddenLine xmlns:a14="http://schemas.microsoft.com/office/drawing/2010/main" xmlns="" w="9525">
                   <a:solidFill>
                     <a:srgbClr val="000000"/>
                   </a:solidFill>
@@ -4300,7 +4300,7 @@
             </a:ln>
             <a:extLst>
               <a:ext uri="{91240B29-F687-4f45-9708-019B960494DF}">
-                <a14:hiddenLine xmlns="" xmlns:a14="http://schemas.microsoft.com/office/drawing/2010/main" w="9525">
+                <a14:hiddenLine xmlns:a14="http://schemas.microsoft.com/office/drawing/2010/main" xmlns="" w="9525">
                   <a:solidFill>
                     <a:srgbClr val="000000"/>
                   </a:solidFill>
@@ -4390,7 +4390,7 @@
             </a:ln>
             <a:extLst>
               <a:ext uri="{91240B29-F687-4f45-9708-019B960494DF}">
-                <a14:hiddenLine xmlns="" xmlns:a14="http://schemas.microsoft.com/office/drawing/2010/main" w="9525">
+                <a14:hiddenLine xmlns:a14="http://schemas.microsoft.com/office/drawing/2010/main" xmlns="" w="9525">
                   <a:solidFill>
                     <a:srgbClr val="000000"/>
                   </a:solidFill>
@@ -4480,7 +4480,7 @@
             </a:ln>
             <a:extLst>
               <a:ext uri="{91240B29-F687-4f45-9708-019B960494DF}">
-                <a14:hiddenLine xmlns="" xmlns:a14="http://schemas.microsoft.com/office/drawing/2010/main" w="9525">
+                <a14:hiddenLine xmlns:a14="http://schemas.microsoft.com/office/drawing/2010/main" xmlns="" w="9525">
                   <a:solidFill>
                     <a:srgbClr val="000000"/>
                   </a:solidFill>
@@ -4542,7 +4542,7 @@
             </a:ln>
             <a:extLst>
               <a:ext uri="{91240B29-F687-4f45-9708-019B960494DF}">
-                <a14:hiddenLine xmlns="" xmlns:a14="http://schemas.microsoft.com/office/drawing/2010/main" w="9525">
+                <a14:hiddenLine xmlns:a14="http://schemas.microsoft.com/office/drawing/2010/main" xmlns="" w="9525">
                   <a:solidFill>
                     <a:srgbClr val="000000"/>
                   </a:solidFill>
@@ -4662,7 +4662,7 @@
             </a:ln>
             <a:extLst>
               <a:ext uri="{91240B29-F687-4f45-9708-019B960494DF}">
-                <a14:hiddenLine xmlns="" xmlns:a14="http://schemas.microsoft.com/office/drawing/2010/main" w="9525">
+                <a14:hiddenLine xmlns:a14="http://schemas.microsoft.com/office/drawing/2010/main" xmlns="" w="9525">
                   <a:solidFill>
                     <a:srgbClr val="000000"/>
                   </a:solidFill>
@@ -4730,7 +4730,7 @@
             </a:ln>
             <a:extLst>
               <a:ext uri="{91240B29-F687-4f45-9708-019B960494DF}">
-                <a14:hiddenLine xmlns="" xmlns:a14="http://schemas.microsoft.com/office/drawing/2010/main" w="9525">
+                <a14:hiddenLine xmlns:a14="http://schemas.microsoft.com/office/drawing/2010/main" xmlns="" w="9525">
                   <a:solidFill>
                     <a:srgbClr val="000000"/>
                   </a:solidFill>
@@ -4820,7 +4820,7 @@
             </a:ln>
             <a:extLst>
               <a:ext uri="{91240B29-F687-4f45-9708-019B960494DF}">
-                <a14:hiddenLine xmlns="" xmlns:a14="http://schemas.microsoft.com/office/drawing/2010/main" w="9525">
+                <a14:hiddenLine xmlns:a14="http://schemas.microsoft.com/office/drawing/2010/main" xmlns="" w="9525">
                   <a:solidFill>
                     <a:srgbClr val="000000"/>
                   </a:solidFill>
@@ -8009,7 +8009,7 @@
     </p:spTree>
     <p:extLst>
       <p:ext uri="{BB962C8B-B14F-4D97-AF65-F5344CB8AC3E}">
-        <p14:creationId xmlns:p14="http://schemas.microsoft.com/office/powerpoint/2010/main" val="2129223248"/>
+        <p14:creationId xmlns:p14="http://schemas.microsoft.com/office/powerpoint/2010/main" val="1137129128"/>
       </p:ext>
     </p:extLst>
   </p:cSld>
@@ -8209,7 +8209,7 @@
     </p:spTree>
     <p:extLst>
       <p:ext uri="{BB962C8B-B14F-4D97-AF65-F5344CB8AC3E}">
-        <p14:creationId xmlns:p14="http://schemas.microsoft.com/office/powerpoint/2010/main" val="259718797"/>
+        <p14:creationId xmlns:p14="http://schemas.microsoft.com/office/powerpoint/2010/main" val="1332888110"/>
       </p:ext>
     </p:extLst>
   </p:cSld>
@@ -8655,7 +8655,7 @@
     </p:spTree>
     <p:extLst>
       <p:ext uri="{BB962C8B-B14F-4D97-AF65-F5344CB8AC3E}">
-        <p14:creationId xmlns:p14="http://schemas.microsoft.com/office/powerpoint/2010/main" val="1545822896"/>
+        <p14:creationId xmlns:p14="http://schemas.microsoft.com/office/powerpoint/2010/main" val="3241276804"/>
       </p:ext>
     </p:extLst>
   </p:cSld>
@@ -8923,7 +8923,7 @@
     </p:spTree>
     <p:extLst>
       <p:ext uri="{BB962C8B-B14F-4D97-AF65-F5344CB8AC3E}">
-        <p14:creationId xmlns:p14="http://schemas.microsoft.com/office/powerpoint/2010/main" val="2717728948"/>
+        <p14:creationId xmlns:p14="http://schemas.microsoft.com/office/powerpoint/2010/main" val="2680025646"/>
       </p:ext>
     </p:extLst>
   </p:cSld>
@@ -9338,7 +9338,7 @@
     </p:spTree>
     <p:extLst>
       <p:ext uri="{BB962C8B-B14F-4D97-AF65-F5344CB8AC3E}">
-        <p14:creationId xmlns:p14="http://schemas.microsoft.com/office/powerpoint/2010/main" val="241136637"/>
+        <p14:creationId xmlns:p14="http://schemas.microsoft.com/office/powerpoint/2010/main" val="1216791244"/>
       </p:ext>
     </p:extLst>
   </p:cSld>
@@ -9480,7 +9480,7 @@
     </p:spTree>
     <p:extLst>
       <p:ext uri="{BB962C8B-B14F-4D97-AF65-F5344CB8AC3E}">
-        <p14:creationId xmlns:p14="http://schemas.microsoft.com/office/powerpoint/2010/main" val="734037075"/>
+        <p14:creationId xmlns:p14="http://schemas.microsoft.com/office/powerpoint/2010/main" val="3189806579"/>
       </p:ext>
     </p:extLst>
   </p:cSld>
@@ -9593,7 +9593,7 @@
     </p:spTree>
     <p:extLst>
       <p:ext uri="{BB962C8B-B14F-4D97-AF65-F5344CB8AC3E}">
-        <p14:creationId xmlns:p14="http://schemas.microsoft.com/office/powerpoint/2010/main" val="3360042215"/>
+        <p14:creationId xmlns:p14="http://schemas.microsoft.com/office/powerpoint/2010/main" val="2209290622"/>
       </p:ext>
     </p:extLst>
   </p:cSld>
@@ -9906,7 +9906,7 @@
     </p:spTree>
     <p:extLst>
       <p:ext uri="{BB962C8B-B14F-4D97-AF65-F5344CB8AC3E}">
-        <p14:creationId xmlns:p14="http://schemas.microsoft.com/office/powerpoint/2010/main" val="1204758725"/>
+        <p14:creationId xmlns:p14="http://schemas.microsoft.com/office/powerpoint/2010/main" val="1138049960"/>
       </p:ext>
     </p:extLst>
   </p:cSld>
@@ -10195,7 +10195,7 @@
     </p:spTree>
     <p:extLst>
       <p:ext uri="{BB962C8B-B14F-4D97-AF65-F5344CB8AC3E}">
-        <p14:creationId xmlns:p14="http://schemas.microsoft.com/office/powerpoint/2010/main" val="2498185415"/>
+        <p14:creationId xmlns:p14="http://schemas.microsoft.com/office/powerpoint/2010/main" val="2010675230"/>
       </p:ext>
     </p:extLst>
   </p:cSld>
@@ -10395,7 +10395,7 @@
     </p:spTree>
     <p:extLst>
       <p:ext uri="{BB962C8B-B14F-4D97-AF65-F5344CB8AC3E}">
-        <p14:creationId xmlns:p14="http://schemas.microsoft.com/office/powerpoint/2010/main" val="3753329053"/>
+        <p14:creationId xmlns:p14="http://schemas.microsoft.com/office/powerpoint/2010/main" val="2412875954"/>
       </p:ext>
     </p:extLst>
   </p:cSld>
@@ -10605,7 +10605,7 @@
     </p:spTree>
     <p:extLst>
       <p:ext uri="{BB962C8B-B14F-4D97-AF65-F5344CB8AC3E}">
-        <p14:creationId xmlns:p14="http://schemas.microsoft.com/office/powerpoint/2010/main" val="3188107149"/>
+        <p14:creationId xmlns:p14="http://schemas.microsoft.com/office/powerpoint/2010/main" val="2223407999"/>
       </p:ext>
     </p:extLst>
   </p:cSld>
@@ -12285,7 +12285,7 @@
           <a:noFill/>
           <a:extLst>
             <a:ext uri="{909E8E84-426E-40dd-AFC4-6F175D3DCCD1}">
-              <a14:hiddenFill xmlns="" xmlns:a14="http://schemas.microsoft.com/office/drawing/2010/main">
+              <a14:hiddenFill xmlns:a14="http://schemas.microsoft.com/office/drawing/2010/main" xmlns="">
                 <a:solidFill>
                   <a:srgbClr val="FFFFFF"/>
                 </a:solidFill>
@@ -12359,7 +12359,7 @@
               </a:ln>
               <a:extLst>
                 <a:ext uri="{91240B29-F687-4f45-9708-019B960494DF}">
-                  <a14:hiddenLine xmlns="" xmlns:a14="http://schemas.microsoft.com/office/drawing/2010/main" w="9525">
+                  <a14:hiddenLine xmlns:a14="http://schemas.microsoft.com/office/drawing/2010/main" xmlns="" w="9525">
                     <a:solidFill>
                       <a:srgbClr val="000000"/>
                     </a:solidFill>
@@ -12449,7 +12449,7 @@
               </a:ln>
               <a:extLst>
                 <a:ext uri="{91240B29-F687-4f45-9708-019B960494DF}">
-                  <a14:hiddenLine xmlns="" xmlns:a14="http://schemas.microsoft.com/office/drawing/2010/main" w="9525">
+                  <a14:hiddenLine xmlns:a14="http://schemas.microsoft.com/office/drawing/2010/main" xmlns="" w="9525">
                     <a:solidFill>
                       <a:srgbClr val="000000"/>
                     </a:solidFill>
@@ -12539,7 +12539,7 @@
               </a:ln>
               <a:extLst>
                 <a:ext uri="{91240B29-F687-4f45-9708-019B960494DF}">
-                  <a14:hiddenLine xmlns="" xmlns:a14="http://schemas.microsoft.com/office/drawing/2010/main" w="9525">
+                  <a14:hiddenLine xmlns:a14="http://schemas.microsoft.com/office/drawing/2010/main" xmlns="" w="9525">
                     <a:solidFill>
                       <a:srgbClr val="000000"/>
                     </a:solidFill>
@@ -12601,7 +12601,7 @@
               </a:ln>
               <a:extLst>
                 <a:ext uri="{91240B29-F687-4f45-9708-019B960494DF}">
-                  <a14:hiddenLine xmlns="" xmlns:a14="http://schemas.microsoft.com/office/drawing/2010/main" w="9525">
+                  <a14:hiddenLine xmlns:a14="http://schemas.microsoft.com/office/drawing/2010/main" xmlns="" w="9525">
                     <a:solidFill>
                       <a:srgbClr val="000000"/>
                     </a:solidFill>
@@ -12691,7 +12691,7 @@
               </a:ln>
               <a:extLst>
                 <a:ext uri="{91240B29-F687-4f45-9708-019B960494DF}">
-                  <a14:hiddenLine xmlns="" xmlns:a14="http://schemas.microsoft.com/office/drawing/2010/main" w="9525">
+                  <a14:hiddenLine xmlns:a14="http://schemas.microsoft.com/office/drawing/2010/main" xmlns="" w="9525">
                     <a:solidFill>
                       <a:srgbClr val="000000"/>
                     </a:solidFill>
@@ -12753,7 +12753,7 @@
               </a:ln>
               <a:extLst>
                 <a:ext uri="{91240B29-F687-4f45-9708-019B960494DF}">
-                  <a14:hiddenLine xmlns="" xmlns:a14="http://schemas.microsoft.com/office/drawing/2010/main" w="9525">
+                  <a14:hiddenLine xmlns:a14="http://schemas.microsoft.com/office/drawing/2010/main" xmlns="" w="9525">
                     <a:solidFill>
                       <a:srgbClr val="000000"/>
                     </a:solidFill>
@@ -12815,7 +12815,7 @@
               </a:ln>
               <a:extLst>
                 <a:ext uri="{91240B29-F687-4f45-9708-019B960494DF}">
-                  <a14:hiddenLine xmlns="" xmlns:a14="http://schemas.microsoft.com/office/drawing/2010/main" w="9525">
+                  <a14:hiddenLine xmlns:a14="http://schemas.microsoft.com/office/drawing/2010/main" xmlns="" w="9525">
                     <a:solidFill>
                       <a:srgbClr val="000000"/>
                     </a:solidFill>
@@ -12905,7 +12905,7 @@
               </a:ln>
               <a:extLst>
                 <a:ext uri="{91240B29-F687-4f45-9708-019B960494DF}">
-                  <a14:hiddenLine xmlns="" xmlns:a14="http://schemas.microsoft.com/office/drawing/2010/main" w="9525">
+                  <a14:hiddenLine xmlns:a14="http://schemas.microsoft.com/office/drawing/2010/main" xmlns="" w="9525">
                     <a:solidFill>
                       <a:srgbClr val="000000"/>
                     </a:solidFill>
@@ -12995,7 +12995,7 @@
               </a:ln>
               <a:extLst>
                 <a:ext uri="{91240B29-F687-4f45-9708-019B960494DF}">
-                  <a14:hiddenLine xmlns="" xmlns:a14="http://schemas.microsoft.com/office/drawing/2010/main" w="9525">
+                  <a14:hiddenLine xmlns:a14="http://schemas.microsoft.com/office/drawing/2010/main" xmlns="" w="9525">
                     <a:solidFill>
                       <a:srgbClr val="000000"/>
                     </a:solidFill>
@@ -13057,7 +13057,7 @@
               </a:ln>
               <a:extLst>
                 <a:ext uri="{91240B29-F687-4f45-9708-019B960494DF}">
-                  <a14:hiddenLine xmlns="" xmlns:a14="http://schemas.microsoft.com/office/drawing/2010/main" w="9525">
+                  <a14:hiddenLine xmlns:a14="http://schemas.microsoft.com/office/drawing/2010/main" xmlns="" w="9525">
                     <a:solidFill>
                       <a:srgbClr val="000000"/>
                     </a:solidFill>
@@ -13167,7 +13167,7 @@
               </a:ln>
               <a:extLst>
                 <a:ext uri="{91240B29-F687-4f45-9708-019B960494DF}">
-                  <a14:hiddenLine xmlns="" xmlns:a14="http://schemas.microsoft.com/office/drawing/2010/main" w="9525">
+                  <a14:hiddenLine xmlns:a14="http://schemas.microsoft.com/office/drawing/2010/main" xmlns="" w="9525">
                     <a:solidFill>
                       <a:srgbClr val="000000"/>
                     </a:solidFill>
@@ -13251,7 +13251,7 @@
               </a:ln>
               <a:extLst>
                 <a:ext uri="{91240B29-F687-4f45-9708-019B960494DF}">
-                  <a14:hiddenLine xmlns="" xmlns:a14="http://schemas.microsoft.com/office/drawing/2010/main" w="9525">
+                  <a14:hiddenLine xmlns:a14="http://schemas.microsoft.com/office/drawing/2010/main" xmlns="" w="9525">
                     <a:solidFill>
                       <a:srgbClr val="000000"/>
                     </a:solidFill>
@@ -13313,7 +13313,7 @@
               </a:ln>
               <a:extLst>
                 <a:ext uri="{91240B29-F687-4f45-9708-019B960494DF}">
-                  <a14:hiddenLine xmlns="" xmlns:a14="http://schemas.microsoft.com/office/drawing/2010/main" w="9525">
+                  <a14:hiddenLine xmlns:a14="http://schemas.microsoft.com/office/drawing/2010/main" xmlns="" w="9525">
                     <a:solidFill>
                       <a:srgbClr val="000000"/>
                     </a:solidFill>
@@ -13375,7 +13375,7 @@
               </a:ln>
               <a:extLst>
                 <a:ext uri="{91240B29-F687-4f45-9708-019B960494DF}">
-                  <a14:hiddenLine xmlns="" xmlns:a14="http://schemas.microsoft.com/office/drawing/2010/main" w="9525">
+                  <a14:hiddenLine xmlns:a14="http://schemas.microsoft.com/office/drawing/2010/main" xmlns="" w="9525">
                     <a:solidFill>
                       <a:srgbClr val="000000"/>
                     </a:solidFill>
@@ -13465,7 +13465,7 @@
               </a:ln>
               <a:extLst>
                 <a:ext uri="{91240B29-F687-4f45-9708-019B960494DF}">
-                  <a14:hiddenLine xmlns="" xmlns:a14="http://schemas.microsoft.com/office/drawing/2010/main" w="9525">
+                  <a14:hiddenLine xmlns:a14="http://schemas.microsoft.com/office/drawing/2010/main" xmlns="" w="9525">
                     <a:solidFill>
                       <a:srgbClr val="000000"/>
                     </a:solidFill>
@@ -13499,7 +13499,7 @@
               </a:ln>
               <a:extLst>
                 <a:ext uri="{91240B29-F687-4f45-9708-019B960494DF}">
-                  <a14:hiddenLine xmlns="" xmlns:a14="http://schemas.microsoft.com/office/drawing/2010/main" w="9525">
+                  <a14:hiddenLine xmlns:a14="http://schemas.microsoft.com/office/drawing/2010/main" xmlns="" w="9525">
                     <a:solidFill>
                       <a:srgbClr val="000000"/>
                     </a:solidFill>
@@ -13564,7 +13564,7 @@
               </a:ln>
               <a:extLst>
                 <a:ext uri="{91240B29-F687-4f45-9708-019B960494DF}">
-                  <a14:hiddenLine xmlns="" xmlns:a14="http://schemas.microsoft.com/office/drawing/2010/main" w="9525">
+                  <a14:hiddenLine xmlns:a14="http://schemas.microsoft.com/office/drawing/2010/main" xmlns="" w="9525">
                     <a:solidFill>
                       <a:srgbClr val="000000"/>
                     </a:solidFill>
@@ -13654,7 +13654,7 @@
               </a:ln>
               <a:extLst>
                 <a:ext uri="{91240B29-F687-4f45-9708-019B960494DF}">
-                  <a14:hiddenLine xmlns="" xmlns:a14="http://schemas.microsoft.com/office/drawing/2010/main" w="9525">
+                  <a14:hiddenLine xmlns:a14="http://schemas.microsoft.com/office/drawing/2010/main" xmlns="" w="9525">
                     <a:solidFill>
                       <a:srgbClr val="000000"/>
                     </a:solidFill>
@@ -13716,7 +13716,7 @@
               </a:ln>
               <a:extLst>
                 <a:ext uri="{91240B29-F687-4f45-9708-019B960494DF}">
-                  <a14:hiddenLine xmlns="" xmlns:a14="http://schemas.microsoft.com/office/drawing/2010/main" w="9525">
+                  <a14:hiddenLine xmlns:a14="http://schemas.microsoft.com/office/drawing/2010/main" xmlns="" w="9525">
                     <a:solidFill>
                       <a:srgbClr val="000000"/>
                     </a:solidFill>
@@ -13806,7 +13806,7 @@
               </a:ln>
               <a:extLst>
                 <a:ext uri="{91240B29-F687-4f45-9708-019B960494DF}">
-                  <a14:hiddenLine xmlns="" xmlns:a14="http://schemas.microsoft.com/office/drawing/2010/main" w="9525">
+                  <a14:hiddenLine xmlns:a14="http://schemas.microsoft.com/office/drawing/2010/main" xmlns="" w="9525">
                     <a:solidFill>
                       <a:srgbClr val="000000"/>
                     </a:solidFill>
@@ -13871,7 +13871,7 @@
               </a:ln>
               <a:extLst>
                 <a:ext uri="{91240B29-F687-4f45-9708-019B960494DF}">
-                  <a14:hiddenLine xmlns="" xmlns:a14="http://schemas.microsoft.com/office/drawing/2010/main" w="9525">
+                  <a14:hiddenLine xmlns:a14="http://schemas.microsoft.com/office/drawing/2010/main" xmlns="" w="9525">
                     <a:solidFill>
                       <a:srgbClr val="000000"/>
                     </a:solidFill>
@@ -13933,7 +13933,7 @@
               </a:ln>
               <a:extLst>
                 <a:ext uri="{91240B29-F687-4f45-9708-019B960494DF}">
-                  <a14:hiddenLine xmlns="" xmlns:a14="http://schemas.microsoft.com/office/drawing/2010/main" w="9525">
+                  <a14:hiddenLine xmlns:a14="http://schemas.microsoft.com/office/drawing/2010/main" xmlns="" w="9525">
                     <a:solidFill>
                       <a:srgbClr val="000000"/>
                     </a:solidFill>
@@ -14023,7 +14023,7 @@
               </a:ln>
               <a:extLst>
                 <a:ext uri="{91240B29-F687-4f45-9708-019B960494DF}">
-                  <a14:hiddenLine xmlns="" xmlns:a14="http://schemas.microsoft.com/office/drawing/2010/main" w="9525">
+                  <a14:hiddenLine xmlns:a14="http://schemas.microsoft.com/office/drawing/2010/main" xmlns="" w="9525">
                     <a:solidFill>
                       <a:srgbClr val="000000"/>
                     </a:solidFill>
@@ -14113,7 +14113,7 @@
               </a:ln>
               <a:extLst>
                 <a:ext uri="{91240B29-F687-4f45-9708-019B960494DF}">
-                  <a14:hiddenLine xmlns="" xmlns:a14="http://schemas.microsoft.com/office/drawing/2010/main" w="9525">
+                  <a14:hiddenLine xmlns:a14="http://schemas.microsoft.com/office/drawing/2010/main" xmlns="" w="9525">
                     <a:solidFill>
                       <a:srgbClr val="000000"/>
                     </a:solidFill>
@@ -14178,7 +14178,7 @@
               </a:ln>
               <a:extLst>
                 <a:ext uri="{91240B29-F687-4f45-9708-019B960494DF}">
-                  <a14:hiddenLine xmlns="" xmlns:a14="http://schemas.microsoft.com/office/drawing/2010/main" w="9525">
+                  <a14:hiddenLine xmlns:a14="http://schemas.microsoft.com/office/drawing/2010/main" xmlns="" w="9525">
                     <a:solidFill>
                       <a:srgbClr val="000000"/>
                     </a:solidFill>
@@ -14298,7 +14298,7 @@
               </a:ln>
               <a:extLst>
                 <a:ext uri="{91240B29-F687-4f45-9708-019B960494DF}">
-                  <a14:hiddenLine xmlns="" xmlns:a14="http://schemas.microsoft.com/office/drawing/2010/main" w="9525">
+                  <a14:hiddenLine xmlns:a14="http://schemas.microsoft.com/office/drawing/2010/main" xmlns="" w="9525">
                     <a:solidFill>
                       <a:srgbClr val="000000"/>
                     </a:solidFill>
@@ -14379,7 +14379,7 @@
               </a:ln>
               <a:extLst>
                 <a:ext uri="{91240B29-F687-4f45-9708-019B960494DF}">
-                  <a14:hiddenLine xmlns="" xmlns:a14="http://schemas.microsoft.com/office/drawing/2010/main" w="9525">
+                  <a14:hiddenLine xmlns:a14="http://schemas.microsoft.com/office/drawing/2010/main" xmlns="" w="9525">
                     <a:solidFill>
                       <a:srgbClr val="000000"/>
                     </a:solidFill>
@@ -14494,7 +14494,7 @@
               </a:ln>
               <a:extLst>
                 <a:ext uri="{91240B29-F687-4f45-9708-019B960494DF}">
-                  <a14:hiddenLine xmlns="" xmlns:a14="http://schemas.microsoft.com/office/drawing/2010/main" w="9525">
+                  <a14:hiddenLine xmlns:a14="http://schemas.microsoft.com/office/drawing/2010/main" xmlns="" w="9525">
                     <a:solidFill>
                       <a:srgbClr val="000000"/>
                     </a:solidFill>
@@ -14584,7 +14584,7 @@
               </a:ln>
               <a:extLst>
                 <a:ext uri="{91240B29-F687-4f45-9708-019B960494DF}">
-                  <a14:hiddenLine xmlns="" xmlns:a14="http://schemas.microsoft.com/office/drawing/2010/main" w="9525">
+                  <a14:hiddenLine xmlns:a14="http://schemas.microsoft.com/office/drawing/2010/main" xmlns="" w="9525">
                     <a:solidFill>
                       <a:srgbClr val="000000"/>
                     </a:solidFill>
@@ -14649,7 +14649,7 @@
               </a:ln>
               <a:extLst>
                 <a:ext uri="{91240B29-F687-4f45-9708-019B960494DF}">
-                  <a14:hiddenLine xmlns="" xmlns:a14="http://schemas.microsoft.com/office/drawing/2010/main" w="9525">
+                  <a14:hiddenLine xmlns:a14="http://schemas.microsoft.com/office/drawing/2010/main" xmlns="" w="9525">
                     <a:solidFill>
                       <a:srgbClr val="000000"/>
                     </a:solidFill>
@@ -14739,7 +14739,7 @@
               </a:ln>
               <a:extLst>
                 <a:ext uri="{91240B29-F687-4f45-9708-019B960494DF}">
-                  <a14:hiddenLine xmlns="" xmlns:a14="http://schemas.microsoft.com/office/drawing/2010/main" w="9525">
+                  <a14:hiddenLine xmlns:a14="http://schemas.microsoft.com/office/drawing/2010/main" xmlns="" w="9525">
                     <a:solidFill>
                       <a:srgbClr val="000000"/>
                     </a:solidFill>
@@ -14807,7 +14807,7 @@
               </a:ln>
               <a:extLst>
                 <a:ext uri="{91240B29-F687-4f45-9708-019B960494DF}">
-                  <a14:hiddenLine xmlns="" xmlns:a14="http://schemas.microsoft.com/office/drawing/2010/main" w="9525">
+                  <a14:hiddenLine xmlns:a14="http://schemas.microsoft.com/office/drawing/2010/main" xmlns="" w="9525">
                     <a:solidFill>
                       <a:srgbClr val="000000"/>
                     </a:solidFill>
@@ -14897,7 +14897,7 @@
               </a:ln>
               <a:extLst>
                 <a:ext uri="{91240B29-F687-4f45-9708-019B960494DF}">
-                  <a14:hiddenLine xmlns="" xmlns:a14="http://schemas.microsoft.com/office/drawing/2010/main" w="9525">
+                  <a14:hiddenLine xmlns:a14="http://schemas.microsoft.com/office/drawing/2010/main" xmlns="" w="9525">
                     <a:solidFill>
                       <a:srgbClr val="000000"/>
                     </a:solidFill>
@@ -14965,7 +14965,7 @@
               </a:ln>
               <a:extLst>
                 <a:ext uri="{91240B29-F687-4f45-9708-019B960494DF}">
-                  <a14:hiddenLine xmlns="" xmlns:a14="http://schemas.microsoft.com/office/drawing/2010/main" w="9525">
+                  <a14:hiddenLine xmlns:a14="http://schemas.microsoft.com/office/drawing/2010/main" xmlns="" w="9525">
                     <a:solidFill>
                       <a:srgbClr val="000000"/>
                     </a:solidFill>
@@ -15055,7 +15055,7 @@
               </a:ln>
               <a:extLst>
                 <a:ext uri="{91240B29-F687-4f45-9708-019B960494DF}">
-                  <a14:hiddenLine xmlns="" xmlns:a14="http://schemas.microsoft.com/office/drawing/2010/main" w="9525">
+                  <a14:hiddenLine xmlns:a14="http://schemas.microsoft.com/office/drawing/2010/main" xmlns="" w="9525">
                     <a:solidFill>
                       <a:srgbClr val="000000"/>
                     </a:solidFill>
@@ -15089,7 +15089,7 @@
               </a:ln>
               <a:extLst>
                 <a:ext uri="{91240B29-F687-4f45-9708-019B960494DF}">
-                  <a14:hiddenLine xmlns="" xmlns:a14="http://schemas.microsoft.com/office/drawing/2010/main" w="9525">
+                  <a14:hiddenLine xmlns:a14="http://schemas.microsoft.com/office/drawing/2010/main" xmlns="" w="9525">
                     <a:solidFill>
                       <a:srgbClr val="000000"/>
                     </a:solidFill>
@@ -15903,7 +15903,7 @@
     </p:spTree>
     <p:extLst>
       <p:ext uri="{BB962C8B-B14F-4D97-AF65-F5344CB8AC3E}">
-        <p14:creationId xmlns:p14="http://schemas.microsoft.com/office/powerpoint/2010/main" val="1210548507"/>
+        <p14:creationId xmlns:p14="http://schemas.microsoft.com/office/powerpoint/2010/main" val="1473866035"/>
       </p:ext>
     </p:extLst>
   </p:cSld>
@@ -16791,40 +16791,90 @@
             </a:lvl1pPr>
           </a:lstStyle>
           <a:p>
-            <a:r>
-              <a:rPr lang="en-GB" dirty="0">
+            <a:pPr marL="0" marR="0" lvl="0" indent="0" algn="l" defTabSz="914400" rtl="0" eaLnBrk="1" fontAlgn="auto" latinLnBrk="0" hangingPunct="1">
+              <a:lnSpc>
+                <a:spcPct val="90000"/>
+              </a:lnSpc>
+              <a:spcBef>
+                <a:spcPct val="0"/>
+              </a:spcBef>
+              <a:spcAft>
+                <a:spcPts val="0"/>
+              </a:spcAft>
+              <a:buClrTx/>
+              <a:buSzTx/>
+              <a:buFontTx/>
+              <a:buNone/>
+              <a:tabLst/>
+              <a:defRPr/>
+            </a:pPr>
+            <a:r>
+              <a:rPr kumimoji="0" lang="en-GB" sz="3600" b="0" i="0" u="none" strike="noStrike" kern="1200" cap="all" spc="0" normalizeH="0" baseline="0" noProof="0" dirty="0">
+                <a:ln>
+                  <a:noFill/>
+                </a:ln>
                 <a:solidFill>
                   <a:sysClr val="windowText" lastClr="000000"/>
                 </a:solidFill>
+                <a:effectLst/>
+                <a:uLnTx/>
+                <a:uFillTx/>
+                <a:latin typeface="Tw Cen MT" panose="020B0602020104020603"/>
+                <a:ea typeface="+mj-ea"/>
+                <a:cs typeface="+mj-cs"/>
               </a:rPr>
               <a:t>Something non-technical that you learned during the project</a:t>
             </a:r>
             <a:br>
-              <a:rPr lang="en-GB" dirty="0">
+              <a:rPr kumimoji="0" lang="en-GB" sz="3600" b="0" i="0" u="none" strike="noStrike" kern="1200" cap="all" spc="0" normalizeH="0" baseline="0" noProof="0" dirty="0">
+                <a:ln>
+                  <a:noFill/>
+                </a:ln>
                 <a:solidFill>
                   <a:sysClr val="windowText" lastClr="000000"/>
                 </a:solidFill>
+                <a:effectLst/>
+                <a:uLnTx/>
+                <a:uFillTx/>
+                <a:latin typeface="Tw Cen MT" panose="020B0602020104020603"/>
+                <a:ea typeface="+mj-ea"/>
+                <a:cs typeface="+mj-cs"/>
               </a:rPr>
             </a:br>
             <a:r>
-              <a:rPr lang="en-GB" sz="2000" b="1" dirty="0">
+              <a:rPr kumimoji="0" lang="en-GB" sz="2000" b="1" i="0" u="none" strike="noStrike" kern="1200" cap="all" spc="0" normalizeH="0" baseline="0" noProof="0" dirty="0">
+                <a:ln>
+                  <a:noFill/>
+                </a:ln>
                 <a:solidFill>
-                  <a:schemeClr val="accent2">
+                  <a:srgbClr val="2683C6">
                     <a:lumMod val="75000"/>
-                  </a:schemeClr>
+                  </a:srgbClr>
                 </a:solidFill>
+                <a:effectLst/>
+                <a:uLnTx/>
+                <a:uFillTx/>
                 <a:latin typeface="Calibri" panose="020F0502020204030204" pitchFamily="34" charset="0"/>
                 <a:ea typeface="Calibri" panose="020F0502020204030204" pitchFamily="34" charset="0"/>
                 <a:cs typeface="Times New Roman" panose="02020603050405020304" pitchFamily="18" charset="0"/>
               </a:rPr>
               <a:t>Amrit pal Singh</a:t>
             </a:r>
-            <a:endParaRPr lang="en-GB" b="1" dirty="0">
+            <a:endParaRPr kumimoji="0" lang="en-GB" sz="3600" b="1" i="0" u="none" strike="noStrike" kern="1200" cap="all" spc="0" normalizeH="0" baseline="0" noProof="0" dirty="0">
+              <a:ln>
+                <a:noFill/>
+              </a:ln>
               <a:solidFill>
-                <a:schemeClr val="accent2">
+                <a:srgbClr val="2683C6">
                   <a:lumMod val="75000"/>
-                </a:schemeClr>
+                </a:srgbClr>
               </a:solidFill>
+              <a:effectLst/>
+              <a:uLnTx/>
+              <a:uFillTx/>
+              <a:latin typeface="Tw Cen MT" panose="020B0602020104020603"/>
+              <a:ea typeface="+mj-ea"/>
+              <a:cs typeface="+mj-cs"/>
             </a:endParaRPr>
           </a:p>
         </p:txBody>
@@ -17080,29 +17130,54 @@
           </a:bodyPr>
           <a:lstStyle/>
           <a:p>
-            <a:pPr marL="234000" indent="-234000">
+            <a:pPr marL="234000" marR="0" lvl="0" indent="-234000" algn="l" defTabSz="457200" rtl="0" eaLnBrk="1" fontAlgn="auto" latinLnBrk="0" hangingPunct="1">
               <a:lnSpc>
                 <a:spcPct val="120000"/>
               </a:lnSpc>
               <a:spcBef>
                 <a:spcPts val="1200"/>
               </a:spcBef>
+              <a:spcAft>
+                <a:spcPts val="0"/>
+              </a:spcAft>
+              <a:buClrTx/>
               <a:buSzPct val="125000"/>
               <a:buFont typeface="Arial" panose="020B0604020202020204" pitchFamily="34" charset="0"/>
               <a:buChar char="•"/>
+              <a:tabLst/>
+              <a:defRPr/>
             </a:pPr>
             <a:r>
-              <a:rPr lang="en-GB" sz="2400" dirty="0">
+              <a:rPr kumimoji="0" lang="en-GB" sz="2400" b="0" i="0" u="none" strike="noStrike" kern="1200" cap="none" spc="0" normalizeH="0" baseline="0" noProof="0" dirty="0">
+                <a:ln>
+                  <a:noFill/>
+                </a:ln>
                 <a:solidFill>
-                  <a:schemeClr val="bg1"/>
+                  <a:prstClr val="black"/>
                 </a:solidFill>
+                <a:effectLst/>
+                <a:uLnTx/>
+                <a:uFillTx/>
                 <a:latin typeface="Rockwell" panose="02060603020205020403" pitchFamily="18" charset="0"/>
+                <a:ea typeface="+mn-ea"/>
+                <a:cs typeface="+mn-cs"/>
               </a:rPr>
               <a:t>Before any other additions, user feedback must be taken into consideration throughout the implementation </a:t>
             </a:r>
             <a:r>
-              <a:rPr lang="en-GB" sz="2400" dirty="0">
+              <a:rPr kumimoji="0" lang="en-GB" sz="2400" b="0" i="0" u="none" strike="noStrike" kern="1200" cap="none" spc="0" normalizeH="0" baseline="0" noProof="0" dirty="0">
+                <a:ln>
+                  <a:noFill/>
+                </a:ln>
+                <a:solidFill>
+                  <a:prstClr val="white"/>
+                </a:solidFill>
+                <a:effectLst/>
+                <a:uLnTx/>
+                <a:uFillTx/>
                 <a:latin typeface="Rockwell" panose="02060603020205020403" pitchFamily="18" charset="0"/>
+                <a:ea typeface="+mn-ea"/>
+                <a:cs typeface="+mn-cs"/>
               </a:rPr>
               <a:t>process</a:t>
             </a:r>
@@ -19330,7 +19405,7 @@
                   <a:schemeClr val="bg1"/>
                 </a:solidFill>
               </a:rPr>
-              <a:t>We chose this language due to its flexibility and our previous experience with it.</a:t>
+              <a:t>We chose this language due to its flexibility and our previous experience</a:t>
             </a:r>
           </a:p>
           <a:p>
@@ -19488,7 +19563,7 @@
         </p:spPr>
         <p:txBody>
           <a:bodyPr>
-            <a:normAutofit fontScale="70000" lnSpcReduction="20000"/>
+            <a:normAutofit fontScale="77500" lnSpcReduction="20000"/>
           </a:bodyPr>
           <a:lstStyle/>
           <a:p>
@@ -19508,7 +19583,7 @@
                   <a:schemeClr val="bg1"/>
                 </a:solidFill>
               </a:rPr>
-              <a:t>We used OOP for the main file, with the code for the main screens, setup and in-game mechanics.</a:t>
+              <a:t>OOP for the main file</a:t>
             </a:r>
           </a:p>
           <a:p>
@@ -19518,7 +19593,7 @@
                   <a:schemeClr val="bg1"/>
                 </a:solidFill>
               </a:rPr>
-              <a:t>We used functional programming for modular aspects like the grade calculator and avatar customisation</a:t>
+              <a:t>Functional programming for modular aspects like the grade calculator and avatar customisation</a:t>
             </a:r>
           </a:p>
           <a:p>
@@ -19714,7 +19789,7 @@
                   <a:schemeClr val="bg1"/>
                 </a:solidFill>
               </a:rPr>
-              <a:t>We chose it due to its adaptability and the previous experience of members.</a:t>
+              <a:t>Chosen due to its adaptability and the previous experience of members.</a:t>
             </a:r>
           </a:p>
           <a:p>
@@ -19724,7 +19799,7 @@
                   <a:schemeClr val="bg1"/>
                 </a:solidFill>
               </a:rPr>
-              <a:t>It also can be easily used with an object-oriented approach, which made our code extremely modular and organised.</a:t>
+              <a:t>It can be easily used with an object-oriented approach</a:t>
             </a:r>
           </a:p>
           <a:p>
@@ -19734,7 +19809,7 @@
                   <a:schemeClr val="bg1"/>
                 </a:solidFill>
               </a:rPr>
-              <a:t>We wanted to use a totally offline simulator with simple installation, so used a Tkinter-based GUI instead of something like a webapp.</a:t>
+              <a:t>We wanted our simulator to be simply-installed and totally offline.</a:t>
             </a:r>
           </a:p>
         </p:txBody>
@@ -19881,7 +19956,7 @@
         </p:spPr>
         <p:txBody>
           <a:bodyPr>
-            <a:normAutofit fontScale="85000" lnSpcReduction="20000"/>
+            <a:normAutofit fontScale="92500"/>
           </a:bodyPr>
           <a:lstStyle/>
           <a:p>
@@ -19891,7 +19966,7 @@
                   <a:schemeClr val="bg1"/>
                 </a:solidFill>
               </a:rPr>
-              <a:t>We used Tkinter in the main file to create class-based screens that instantiated other screen objects as the user navigated the simulator.</a:t>
+              <a:t>Used in main file to create screen objects that the user could navigate through.</a:t>
             </a:r>
           </a:p>
           <a:p>
@@ -19901,7 +19976,7 @@
                   <a:schemeClr val="bg1"/>
                 </a:solidFill>
               </a:rPr>
-              <a:t>For some other features we used it in a functional way to create screens and then send the outputs back to the main file.</a:t>
+              <a:t>Used it in a functional way to create screens and then send the outputs back to the main file.</a:t>
             </a:r>
           </a:p>
           <a:p>
@@ -19911,7 +19986,7 @@
                   <a:schemeClr val="bg1"/>
                 </a:solidFill>
               </a:rPr>
-              <a:t>We used various Tkinter features to create varying types of display with several types of widgets and layout managers.</a:t>
+              <a:t>We used various Tkinter features to create various types of displays.</a:t>
             </a:r>
           </a:p>
         </p:txBody>
@@ -20110,10 +20185,15 @@
             <p:ph idx="1"/>
           </p:nvPr>
         </p:nvSpPr>
-        <p:spPr/>
+        <p:spPr>
+          <a:xfrm>
+            <a:off x="1141412" y="2249487"/>
+            <a:ext cx="9905999" cy="3445460"/>
+          </a:xfrm>
+        </p:spPr>
         <p:txBody>
           <a:bodyPr>
-            <a:normAutofit lnSpcReduction="10000"/>
+            <a:normAutofit/>
           </a:bodyPr>
           <a:lstStyle/>
           <a:p>
@@ -20123,7 +20203,7 @@
                   <a:schemeClr val="bg1"/>
                 </a:solidFill>
               </a:rPr>
-              <a:t>For all of our databases we used the sqlite3 Python library.</a:t>
+              <a:t>All of our databases were made and managed using the sqlite3 Python library.</a:t>
             </a:r>
           </a:p>
           <a:p>
@@ -20133,7 +20213,7 @@
                   <a:schemeClr val="bg1"/>
                 </a:solidFill>
               </a:rPr>
-              <a:t>We chose this due to our previous experience with SQL and the flexibility and mobility.</a:t>
+              <a:t>We chose this due to our previous experience with SQL and its flexibility.</a:t>
             </a:r>
           </a:p>
           <a:p>
@@ -20155,39 +20235,6 @@
               </a:rPr>
               <a:t>Allows the use of standard SQL statements to operate on and create databases.</a:t>
             </a:r>
-          </a:p>
-          <a:p>
-            <a:r>
-              <a:rPr lang="en-GB" dirty="0">
-                <a:solidFill>
-                  <a:schemeClr val="bg1"/>
-                </a:solidFill>
-              </a:rPr>
-              <a:t>Creates simple .</a:t>
-            </a:r>
-            <a:r>
-              <a:rPr lang="en-GB" dirty="0" err="1">
-                <a:solidFill>
-                  <a:schemeClr val="bg1"/>
-                </a:solidFill>
-              </a:rPr>
-              <a:t>db</a:t>
-            </a:r>
-            <a:r>
-              <a:rPr lang="en-GB" dirty="0">
-                <a:solidFill>
-                  <a:schemeClr val="bg1"/>
-                </a:solidFill>
-              </a:rPr>
-              <a:t> files that can be easily created and managed.</a:t>
-            </a:r>
-          </a:p>
-          <a:p>
-            <a:endParaRPr lang="en-GB" dirty="0">
-              <a:solidFill>
-                <a:schemeClr val="bg1"/>
-              </a:solidFill>
-            </a:endParaRPr>
           </a:p>
         </p:txBody>
       </p:sp>
@@ -20324,7 +20371,7 @@
         </p:spPr>
         <p:txBody>
           <a:bodyPr>
-            <a:normAutofit fontScale="85000" lnSpcReduction="20000"/>
+            <a:normAutofit/>
           </a:bodyPr>
           <a:lstStyle/>
           <a:p>
@@ -20334,7 +20381,7 @@
                   <a:schemeClr val="bg1"/>
                 </a:solidFill>
               </a:rPr>
-              <a:t>We used sqlite3 databases for character data, activities, feedback and topics.</a:t>
+              <a:t>SQLite3 databases for character data and data.</a:t>
             </a:r>
           </a:p>
           <a:p>
@@ -20344,7 +20391,7 @@
                   <a:schemeClr val="bg1"/>
                 </a:solidFill>
               </a:rPr>
-              <a:t>This allowed us to create a dynamic saving/loading feature where character details are automatically saved and then can be loaded again at any time.</a:t>
+              <a:t>Allows us to implement a dynamic saving/loading system.</a:t>
             </a:r>
           </a:p>
           <a:p>
@@ -20354,15 +20401,8 @@
                   <a:schemeClr val="bg1"/>
                 </a:solidFill>
               </a:rPr>
-              <a:t>SQL statements were used to fetch character data for the final score calculation and all of the character information that could be viewed in the game.</a:t>
-            </a:r>
-          </a:p>
-          <a:p>
-            <a:endParaRPr lang="en-GB" dirty="0">
-              <a:solidFill>
-                <a:schemeClr val="bg1"/>
-              </a:solidFill>
-            </a:endParaRPr>
+              <a:t>SQL statements used to fetch and alter character data when needed.</a:t>
+            </a:r>
           </a:p>
         </p:txBody>
       </p:sp>
@@ -20840,10 +20880,36 @@
             </a:lvl1pPr>
           </a:lstStyle>
           <a:p>
-            <a:endParaRPr lang="en-GB" sz="2800" dirty="0">
+            <a:pPr marL="0" marR="0" lvl="0" indent="0" algn="l" defTabSz="914400" rtl="0" eaLnBrk="1" fontAlgn="auto" latinLnBrk="0" hangingPunct="1">
+              <a:lnSpc>
+                <a:spcPct val="90000"/>
+              </a:lnSpc>
+              <a:spcBef>
+                <a:spcPct val="0"/>
+              </a:spcBef>
+              <a:spcAft>
+                <a:spcPts val="0"/>
+              </a:spcAft>
+              <a:buClrTx/>
+              <a:buSzTx/>
+              <a:buFontTx/>
+              <a:buNone/>
+              <a:tabLst/>
+              <a:defRPr/>
+            </a:pPr>
+            <a:endParaRPr kumimoji="0" lang="en-GB" sz="2800" b="0" i="0" u="none" strike="noStrike" kern="1200" cap="all" spc="0" normalizeH="0" baseline="0" noProof="0" dirty="0">
+              <a:ln>
+                <a:noFill/>
+              </a:ln>
               <a:solidFill>
                 <a:sysClr val="windowText" lastClr="000000"/>
               </a:solidFill>
+              <a:effectLst/>
+              <a:uLnTx/>
+              <a:uFillTx/>
+              <a:latin typeface="Tw Cen MT" panose="020B0602020104020603"/>
+              <a:ea typeface="+mj-ea"/>
+              <a:cs typeface="+mj-cs"/>
             </a:endParaRPr>
           </a:p>
         </p:txBody>
@@ -20895,11 +20961,37 @@
             </a:lvl1pPr>
           </a:lstStyle>
           <a:p>
-            <a:r>
-              <a:rPr lang="en-GB" sz="2000" dirty="0">
+            <a:pPr marL="0" marR="0" lvl="0" indent="0" algn="l" defTabSz="914400" rtl="0" eaLnBrk="1" fontAlgn="auto" latinLnBrk="0" hangingPunct="1">
+              <a:lnSpc>
+                <a:spcPct val="90000"/>
+              </a:lnSpc>
+              <a:spcBef>
+                <a:spcPct val="0"/>
+              </a:spcBef>
+              <a:spcAft>
+                <a:spcPts val="0"/>
+              </a:spcAft>
+              <a:buClrTx/>
+              <a:buSzTx/>
+              <a:buFontTx/>
+              <a:buNone/>
+              <a:tabLst/>
+              <a:defRPr/>
+            </a:pPr>
+            <a:r>
+              <a:rPr kumimoji="0" lang="en-GB" sz="2000" b="0" i="0" u="none" strike="noStrike" kern="1200" cap="all" spc="0" normalizeH="0" baseline="0" noProof="0" dirty="0">
+                <a:ln>
+                  <a:noFill/>
+                </a:ln>
                 <a:solidFill>
                   <a:sysClr val="windowText" lastClr="000000"/>
                 </a:solidFill>
+                <a:effectLst/>
+                <a:uLnTx/>
+                <a:uFillTx/>
+                <a:latin typeface="Tw Cen MT" panose="020B0602020104020603"/>
+                <a:ea typeface="+mj-ea"/>
+                <a:cs typeface="+mj-cs"/>
               </a:rPr>
               <a:t>Bilal Patel</a:t>
             </a:r>
@@ -22056,6 +22148,14 @@
 </file>
 
 <file path=customXml/item1.xml><?xml version="1.0" encoding="utf-8"?>
+<p:properties xmlns:p="http://schemas.microsoft.com/office/2006/metadata/properties" xmlns:xsi="http://www.w3.org/2001/XMLSchema-instance" xmlns:pc="http://schemas.microsoft.com/office/infopath/2007/PartnerControls">
+  <documentManagement>
+    <MediaServiceKeyPoints xmlns="71af3243-3dd4-4a8d-8c0d-dd76da1f02a5" xsi:nil="true"/>
+  </documentManagement>
+</p:properties>
+</file>
+
+<file path=customXml/item2.xml><?xml version="1.0" encoding="utf-8"?>
 <ct:contentTypeSchema xmlns:ct="http://schemas.microsoft.com/office/2006/metadata/contentType" xmlns:ma="http://schemas.microsoft.com/office/2006/metadata/properties/metaAttributes" ct:_="" ma:_="" ma:contentTypeName="Document" ma:contentTypeID="0x01010079F111ED35F8CC479449609E8A0923A6" ma:contentTypeVersion="11" ma:contentTypeDescription="Create a new document." ma:contentTypeScope="" ma:versionID="96291512c1ee715ab617f4c07df79fc1">
   <xsd:schema xmlns:xsd="http://www.w3.org/2001/XMLSchema" xmlns:xs="http://www.w3.org/2001/XMLSchema" xmlns:p="http://schemas.microsoft.com/office/2006/metadata/properties" xmlns:ns2="71af3243-3dd4-4a8d-8c0d-dd76da1f02a5" xmlns:ns3="16c05727-aa75-4e4a-9b5f-8a80a1165891" targetNamespace="http://schemas.microsoft.com/office/2006/metadata/properties" ma:root="true" ma:fieldsID="8256c27c40ca5c40ce1cf6c44f0205df" ns2:_="" ns3:_="">
     <xsd:import namespace="71af3243-3dd4-4a8d-8c0d-dd76da1f02a5"/>
@@ -22266,14 +22366,6 @@
 </ct:contentTypeSchema>
 </file>
 
-<file path=customXml/item2.xml><?xml version="1.0" encoding="utf-8"?>
-<p:properties xmlns:p="http://schemas.microsoft.com/office/2006/metadata/properties" xmlns:xsi="http://www.w3.org/2001/XMLSchema-instance" xmlns:pc="http://schemas.microsoft.com/office/infopath/2007/PartnerControls">
-  <documentManagement>
-    <MediaServiceKeyPoints xmlns="71af3243-3dd4-4a8d-8c0d-dd76da1f02a5" xsi:nil="true"/>
-  </documentManagement>
-</p:properties>
-</file>
-
 <file path=customXml/item3.xml><?xml version="1.0" encoding="utf-8"?>
 <?mso-contentType ?>
 <FormTemplates xmlns="http://schemas.microsoft.com/sharepoint/v3/contenttype/forms">
@@ -22284,6 +22376,16 @@
 </file>
 
 <file path=customXml/itemProps1.xml><?xml version="1.0" encoding="utf-8"?>
+<ds:datastoreItem xmlns:ds="http://schemas.openxmlformats.org/officeDocument/2006/customXml" ds:itemID="{E7866CFD-F94E-4AE5-ACEA-86FEC0F48A10}">
+  <ds:schemaRefs>
+    <ds:schemaRef ds:uri="http://schemas.microsoft.com/office/2006/metadata/properties"/>
+    <ds:schemaRef ds:uri="http://schemas.microsoft.com/office/infopath/2007/PartnerControls"/>
+    <ds:schemaRef ds:uri="71af3243-3dd4-4a8d-8c0d-dd76da1f02a5"/>
+  </ds:schemaRefs>
+</ds:datastoreItem>
+</file>
+
+<file path=customXml/itemProps2.xml><?xml version="1.0" encoding="utf-8"?>
 <ds:datastoreItem xmlns:ds="http://schemas.openxmlformats.org/officeDocument/2006/customXml" ds:itemID="{A7C0B241-13E5-418D-8920-D23491E2D2C0}">
   <ds:schemaRefs>
     <ds:schemaRef ds:uri="http://schemas.microsoft.com/office/2006/metadata/contentType"/>
@@ -22302,16 +22404,6 @@
 </ds:datastoreItem>
 </file>
 
-<file path=customXml/itemProps2.xml><?xml version="1.0" encoding="utf-8"?>
-<ds:datastoreItem xmlns:ds="http://schemas.openxmlformats.org/officeDocument/2006/customXml" ds:itemID="{E7866CFD-F94E-4AE5-ACEA-86FEC0F48A10}">
-  <ds:schemaRefs>
-    <ds:schemaRef ds:uri="http://schemas.microsoft.com/office/2006/metadata/properties"/>
-    <ds:schemaRef ds:uri="http://schemas.microsoft.com/office/infopath/2007/PartnerControls"/>
-    <ds:schemaRef ds:uri="71af3243-3dd4-4a8d-8c0d-dd76da1f02a5"/>
-  </ds:schemaRefs>
-</ds:datastoreItem>
-</file>
-
 <file path=customXml/itemProps3.xml><?xml version="1.0" encoding="utf-8"?>
 <ds:datastoreItem xmlns:ds="http://schemas.openxmlformats.org/officeDocument/2006/customXml" ds:itemID="{B579702B-25C7-40D7-9E29-7686B11A9660}">
   <ds:schemaRefs>

</xml_diff>